<commit_message>
Added SSL wrapper and updated README
</commit_message>
<xml_diff>
--- a/Pirate_Chat_Presentation.pptx
+++ b/Pirate_Chat_Presentation.pptx
@@ -5,17 +5,20 @@
     <p:sldMasterId id="2147483648" r:id="rId1"/>
   </p:sldMasterIdLst>
   <p:notesMasterIdLst>
-    <p:notesMasterId r:id="rId7"/>
+    <p:notesMasterId r:id="rId10"/>
   </p:notesMasterIdLst>
   <p:handoutMasterIdLst>
-    <p:handoutMasterId r:id="rId8"/>
+    <p:handoutMasterId r:id="rId11"/>
   </p:handoutMasterIdLst>
   <p:sldIdLst>
     <p:sldId id="256" r:id="rId2"/>
     <p:sldId id="257" r:id="rId3"/>
     <p:sldId id="258" r:id="rId4"/>
-    <p:sldId id="262" r:id="rId5"/>
-    <p:sldId id="263" r:id="rId6"/>
+    <p:sldId id="265" r:id="rId5"/>
+    <p:sldId id="264" r:id="rId6"/>
+    <p:sldId id="262" r:id="rId7"/>
+    <p:sldId id="266" r:id="rId8"/>
+    <p:sldId id="263" r:id="rId9"/>
   </p:sldIdLst>
   <p:sldSz cx="9144000" cy="6858000" type="screen4x3"/>
   <p:notesSz cx="6858000" cy="9144000"/>
@@ -277,6 +280,34 @@
 </p:handoutMaster>
 </file>
 
+<file path=ppt/ink/ink1.xml><?xml version="1.0" encoding="utf-8"?>
+<inkml:ink xmlns:inkml="http://www.w3.org/2003/InkML">
+  <inkml:definitions>
+    <inkml:context xml:id="ctx0">
+      <inkml:inkSource xml:id="inkSrc0">
+        <inkml:traceFormat>
+          <inkml:channel name="X" type="integer" min="-2.14748E9" max="2.14748E9" units="cm"/>
+          <inkml:channel name="Y" type="integer" min="-2.14748E9" max="2.14748E9" units="cm"/>
+          <inkml:channel name="F" type="integer" max="32767" units="dev"/>
+        </inkml:traceFormat>
+        <inkml:channelProperties>
+          <inkml:channelProperty channel="X" name="resolution" value="1000" units="1/cm"/>
+          <inkml:channelProperty channel="Y" name="resolution" value="1000" units="1/cm"/>
+          <inkml:channelProperty channel="F" name="resolution" value="0" units="1/dev"/>
+        </inkml:channelProperties>
+      </inkml:inkSource>
+      <inkml:timestamp xml:id="ts0" timeString="2025-04-19T20:09:39.733"/>
+    </inkml:context>
+    <inkml:brush xml:id="br0">
+      <inkml:brushProperty name="width" value="0.035" units="cm"/>
+      <inkml:brushProperty name="height" value="0.035" units="cm"/>
+      <inkml:brushProperty name="color" value="#E71224"/>
+    </inkml:brush>
+  </inkml:definitions>
+  <inkml:trace contextRef="#ctx0" brushRef="#br0">2356 58 24575,'-81'1'0,"-68"0"0,-226-27 0,247 9 0,-211 1 0,227 15 0,-94 3 0,190 0 0,1 1 0,0 0 0,-22 7 0,19-4 0,0-1 0,-19 2 0,14-3 0,0 2 0,0 0 0,0 2 0,1 0 0,0 1 0,-34 21 0,-25 25 0,13-6 0,37-27 0,1 2 0,2 1 0,-47 51 0,53-52 0,2 1 0,1 1 0,-26 48 0,-10 8 0,38-59 0,1 0 0,-22 45 0,25-41 0,2 1 0,0 0 0,2 1 0,2 0 0,-8 55 0,10-23 0,3 1 0,10 98 0,32 52 0,-20-124 0,-13-54 0,0 5 0,2 0 0,2-1 0,24 61 0,-6-36 0,-12-24 0,1-1 0,38 58 0,135 144 0,-153-200 0,1-2 0,2-2 0,73 50 0,-66-56 0,1-1 0,94 39 0,-112-56 0,1-2 0,0-1 0,0-1 0,1-2 0,-1-2 0,42 2 0,232-9 0,-225-5 0,0-3 0,81-24 0,-3 2 0,-125 24 0,-1-1 0,1-1 0,-2-2 0,43-23 0,22-10 0,1 0 0,-84 38 0,-1 0 0,0-1 0,-1 0 0,23-22 0,-14 4 0,-17 22 0,0-1 0,0 1 0,1 0 0,-1 0 0,1 1 0,0 0 0,0 0 0,6-4 0,32-19 0,42-37 0,39-25 0,-82 64 0,79-42 0,-95 53 0,0-1 0,-2-1 0,42-34 0,-47 34 0,-15 13 0,9-5 0,-2-2 0,1 1 0,-1-2 0,0 1 0,-1-2 0,0 1 0,-1-1 0,9-16 0,-15 23 0,0 0 0,0 1 0,1-1 0,0 1 0,0-1 0,0 1 0,8-6 0,-8 7 0,1 0 0,-1-1 0,-1 0 0,1 1 0,0-2 0,-1 1 0,0 0 0,0-1 0,4-7 0,2-14 0,-1-1 0,-1 0 0,-1 0 0,-1 0 0,1-33 0,-5-142 0,-3 108 0,3-16 0,2 41 0,-4 0 0,-15-105 0,8 134 0,-2 1 0,-1 0 0,-19-41 0,15 49 0,-34-50 0,21 37 0,16 25 0,-1 0 0,-1 0 0,0 2 0,-2 0 0,0 0 0,-19-14 0,23 24 0,-1-1 0,-1 2 0,1 0 0,-20-6 0,-10-5 0,-106-38 0,137 50 0,-1 1 0,1 0 0,-1 1 0,0 0 0,-20 0 0,-65 2 0,1 0 0,32-8 0,42 5 0,-35-2 0,26 4 0,0-2 0,-36-9 0,36 6 0,1 2 0,-38-2 0,54 7-75,9 0-183,-1 0 0,1 0 0,-1-1 0,-7-1 0,3-2-6568</inkml:trace>
+</inkml:ink>
+</file>
+
 <file path=ppt/notesMasters/notesMaster1.xml><?xml version="1.0" encoding="utf-8"?>
 <p:notesMaster xmlns:a="http://schemas.openxmlformats.org/drawingml/2006/main" xmlns:r="http://schemas.openxmlformats.org/officeDocument/2006/relationships" xmlns:p="http://schemas.openxmlformats.org/presentationml/2006/main">
   <p:cSld>
@@ -1177,7 +1208,7 @@
             <a:fld id="{CA513486-46F1-45D5-AB9B-D96EFCF2ADF7}" type="slidenum">
               <a:rPr lang="en-US"/>
               <a:pPr/>
-              <a:t>4</a:t>
+              <a:t>6</a:t>
             </a:fld>
             <a:endParaRPr lang="en-US"/>
           </a:p>
@@ -1298,7 +1329,7 @@
             <a:fld id="{CA513486-46F1-45D5-AB9B-D96EFCF2ADF7}" type="slidenum">
               <a:rPr lang="en-US"/>
               <a:pPr/>
-              <a:t>5</a:t>
+              <a:t>8</a:t>
             </a:fld>
             <a:endParaRPr lang="en-US"/>
           </a:p>
@@ -3679,8 +3710,8 @@
         </p:nvSpPr>
         <p:spPr bwMode="auto">
           <a:xfrm>
-            <a:off x="925056" y="2492350"/>
-            <a:ext cx="5412059" cy="1477328"/>
+            <a:off x="925056" y="2353851"/>
+            <a:ext cx="5412059" cy="1754326"/>
           </a:xfrm>
           <a:prstGeom prst="rect">
             <a:avLst/>
@@ -3851,6 +3882,48 @@
               </a:rPr>
               <a:t> Each client is handled in a separate thread.</a:t>
             </a:r>
+          </a:p>
+          <a:p>
+            <a:pPr lvl="1" eaLnBrk="0" hangingPunct="0">
+              <a:buFontTx/>
+              <a:buChar char="•"/>
+            </a:pPr>
+            <a:r>
+              <a:rPr kumimoji="0" lang="en-US" altLang="en-US" b="0" i="0" u="none" strike="noStrike" cap="none" normalizeH="0" baseline="0" dirty="0">
+                <a:ln>
+                  <a:noFill/>
+                </a:ln>
+                <a:solidFill>
+                  <a:schemeClr val="tx1"/>
+                </a:solidFill>
+                <a:effectLst/>
+                <a:latin typeface="Arial" panose="020B0604020202020204" pitchFamily="34" charset="0"/>
+              </a:rPr>
+              <a:t> Graceful handling of </a:t>
+            </a:r>
+            <a:r>
+              <a:rPr kumimoji="0" lang="en-US" altLang="en-US" b="0" i="0" u="none" strike="noStrike" cap="none" normalizeH="0" baseline="0">
+                <a:ln>
+                  <a:noFill/>
+                </a:ln>
+                <a:solidFill>
+                  <a:schemeClr val="tx1"/>
+                </a:solidFill>
+                <a:effectLst/>
+                <a:latin typeface="Arial" panose="020B0604020202020204" pitchFamily="34" charset="0"/>
+              </a:rPr>
+              <a:t>multiple clients</a:t>
+            </a:r>
+            <a:endParaRPr kumimoji="0" lang="en-US" altLang="en-US" b="0" i="0" u="none" strike="noStrike" cap="none" normalizeH="0" baseline="0" dirty="0">
+              <a:ln>
+                <a:noFill/>
+              </a:ln>
+              <a:solidFill>
+                <a:schemeClr val="tx1"/>
+              </a:solidFill>
+              <a:effectLst/>
+              <a:latin typeface="Arial" panose="020B0604020202020204" pitchFamily="34" charset="0"/>
+            </a:endParaRPr>
           </a:p>
           <a:p>
             <a:pPr marL="0" marR="0" lvl="0" indent="0" algn="l" defTabSz="914400" rtl="0" eaLnBrk="0" fontAlgn="base" latinLnBrk="0" hangingPunct="0">
@@ -5139,6 +5212,357 @@
 </file>
 
 <file path=ppt/slides/slide4.xml><?xml version="1.0" encoding="utf-8"?>
+<p:sld xmlns:a="http://schemas.openxmlformats.org/drawingml/2006/main" xmlns:r="http://schemas.openxmlformats.org/officeDocument/2006/relationships" xmlns:p="http://schemas.openxmlformats.org/presentationml/2006/main">
+  <p:cSld>
+    <p:spTree>
+      <p:nvGrpSpPr>
+        <p:cNvPr id="1" name=""/>
+        <p:cNvGrpSpPr/>
+        <p:nvPr/>
+      </p:nvGrpSpPr>
+      <p:grpSpPr>
+        <a:xfrm>
+          <a:off x="0" y="0"/>
+          <a:ext cx="0" cy="0"/>
+          <a:chOff x="0" y="0"/>
+          <a:chExt cx="0" cy="0"/>
+        </a:xfrm>
+      </p:grpSpPr>
+      <p:sp>
+        <p:nvSpPr>
+          <p:cNvPr id="2" name="Title 1">
+            <a:extLst>
+              <a:ext uri="{FF2B5EF4-FFF2-40B4-BE49-F238E27FC236}">
+                <a16:creationId xmlns:a16="http://schemas.microsoft.com/office/drawing/2014/main" id="{5B4D12E7-98D7-44A7-015B-2F12CA784794}"/>
+              </a:ext>
+            </a:extLst>
+          </p:cNvPr>
+          <p:cNvSpPr>
+            <a:spLocks noGrp="1"/>
+          </p:cNvSpPr>
+          <p:nvPr>
+            <p:ph type="title"/>
+          </p:nvPr>
+        </p:nvSpPr>
+        <p:spPr/>
+        <p:txBody>
+          <a:bodyPr/>
+          <a:lstStyle/>
+          <a:p>
+            <a:r>
+              <a:rPr lang="en-US" dirty="0"/>
+              <a:t>Server Screenshot</a:t>
+            </a:r>
+          </a:p>
+        </p:txBody>
+      </p:sp>
+      <p:pic>
+        <p:nvPicPr>
+          <p:cNvPr id="5" name="Picture 4">
+            <a:extLst>
+              <a:ext uri="{FF2B5EF4-FFF2-40B4-BE49-F238E27FC236}">
+                <a16:creationId xmlns:a16="http://schemas.microsoft.com/office/drawing/2014/main" id="{D47CF318-06AA-8C98-02EE-226920416DE7}"/>
+              </a:ext>
+            </a:extLst>
+          </p:cNvPr>
+          <p:cNvPicPr>
+            <a:picLocks noChangeAspect="1"/>
+          </p:cNvPicPr>
+          <p:nvPr/>
+        </p:nvPicPr>
+        <p:blipFill>
+          <a:blip r:embed="rId2"/>
+          <a:stretch>
+            <a:fillRect/>
+          </a:stretch>
+        </p:blipFill>
+        <p:spPr>
+          <a:xfrm>
+            <a:off x="762000" y="1676400"/>
+            <a:ext cx="7936284" cy="4605337"/>
+          </a:xfrm>
+          <a:prstGeom prst="rect">
+            <a:avLst/>
+          </a:prstGeom>
+        </p:spPr>
+      </p:pic>
+    </p:spTree>
+    <p:extLst>
+      <p:ext uri="{BB962C8B-B14F-4D97-AF65-F5344CB8AC3E}">
+        <p14:creationId xmlns:p14="http://schemas.microsoft.com/office/powerpoint/2010/main" val="3168529123"/>
+      </p:ext>
+    </p:extLst>
+  </p:cSld>
+  <p:clrMapOvr>
+    <a:masterClrMapping/>
+  </p:clrMapOvr>
+</p:sld>
+</file>
+
+<file path=ppt/slides/slide5.xml><?xml version="1.0" encoding="utf-8"?>
+<p:sld xmlns:a="http://schemas.openxmlformats.org/drawingml/2006/main" xmlns:r="http://schemas.openxmlformats.org/officeDocument/2006/relationships" xmlns:p="http://schemas.openxmlformats.org/presentationml/2006/main">
+  <p:cSld>
+    <p:spTree>
+      <p:nvGrpSpPr>
+        <p:cNvPr id="1" name=""/>
+        <p:cNvGrpSpPr/>
+        <p:nvPr/>
+      </p:nvGrpSpPr>
+      <p:grpSpPr>
+        <a:xfrm>
+          <a:off x="0" y="0"/>
+          <a:ext cx="0" cy="0"/>
+          <a:chOff x="0" y="0"/>
+          <a:chExt cx="0" cy="0"/>
+        </a:xfrm>
+      </p:grpSpPr>
+      <p:sp>
+        <p:nvSpPr>
+          <p:cNvPr id="2" name="Title 1">
+            <a:extLst>
+              <a:ext uri="{FF2B5EF4-FFF2-40B4-BE49-F238E27FC236}">
+                <a16:creationId xmlns:a16="http://schemas.microsoft.com/office/drawing/2014/main" id="{CAD6B774-C258-ED36-8E0C-4BF297EE873F}"/>
+              </a:ext>
+            </a:extLst>
+          </p:cNvPr>
+          <p:cNvSpPr>
+            <a:spLocks noGrp="1"/>
+          </p:cNvSpPr>
+          <p:nvPr>
+            <p:ph type="title"/>
+          </p:nvPr>
+        </p:nvSpPr>
+        <p:spPr/>
+        <p:txBody>
+          <a:bodyPr/>
+          <a:lstStyle/>
+          <a:p>
+            <a:r>
+              <a:rPr lang="en-US" dirty="0"/>
+              <a:t>Proof of SSL Encryption</a:t>
+            </a:r>
+          </a:p>
+        </p:txBody>
+      </p:sp>
+      <p:pic>
+        <p:nvPicPr>
+          <p:cNvPr id="5" name="Picture 4">
+            <a:extLst>
+              <a:ext uri="{FF2B5EF4-FFF2-40B4-BE49-F238E27FC236}">
+                <a16:creationId xmlns:a16="http://schemas.microsoft.com/office/drawing/2014/main" id="{565E6495-70E3-3E35-6B0F-0047972AFF1C}"/>
+              </a:ext>
+            </a:extLst>
+          </p:cNvPr>
+          <p:cNvPicPr>
+            <a:picLocks noChangeAspect="1"/>
+          </p:cNvPicPr>
+          <p:nvPr/>
+        </p:nvPicPr>
+        <p:blipFill>
+          <a:blip r:embed="rId2"/>
+          <a:stretch>
+            <a:fillRect/>
+          </a:stretch>
+        </p:blipFill>
+        <p:spPr>
+          <a:xfrm>
+            <a:off x="0" y="1600167"/>
+            <a:ext cx="9144000" cy="5230740"/>
+          </a:xfrm>
+          <a:prstGeom prst="rect">
+            <a:avLst/>
+          </a:prstGeom>
+        </p:spPr>
+      </p:pic>
+      <p:cxnSp>
+        <p:nvCxnSpPr>
+          <p:cNvPr id="11" name="Straight Arrow Connector 10">
+            <a:extLst>
+              <a:ext uri="{FF2B5EF4-FFF2-40B4-BE49-F238E27FC236}">
+                <a16:creationId xmlns:a16="http://schemas.microsoft.com/office/drawing/2014/main" id="{B6E24A66-7D90-70C8-9A90-70A805B8C7C9}"/>
+              </a:ext>
+            </a:extLst>
+          </p:cNvPr>
+          <p:cNvCxnSpPr>
+            <a:cxnSpLocks/>
+          </p:cNvCxnSpPr>
+          <p:nvPr/>
+        </p:nvCxnSpPr>
+        <p:spPr>
+          <a:xfrm flipH="1" flipV="1">
+            <a:off x="4220369" y="2667000"/>
+            <a:ext cx="351631" cy="381000"/>
+          </a:xfrm>
+          <a:prstGeom prst="straightConnector1">
+            <a:avLst/>
+          </a:prstGeom>
+          <a:ln w="19050" cap="flat" cmpd="sng" algn="ctr">
+            <a:solidFill>
+              <a:schemeClr val="accent3"/>
+            </a:solidFill>
+            <a:prstDash val="solid"/>
+            <a:round/>
+            <a:headEnd type="none" w="med" len="med"/>
+            <a:tailEnd type="arrow" w="med" len="med"/>
+          </a:ln>
+        </p:spPr>
+        <p:style>
+          <a:lnRef idx="0">
+            <a:scrgbClr r="0" g="0" b="0"/>
+          </a:lnRef>
+          <a:fillRef idx="0">
+            <a:scrgbClr r="0" g="0" b="0"/>
+          </a:fillRef>
+          <a:effectRef idx="0">
+            <a:scrgbClr r="0" g="0" b="0"/>
+          </a:effectRef>
+          <a:fontRef idx="minor">
+            <a:schemeClr val="tx1"/>
+          </a:fontRef>
+        </p:style>
+      </p:cxnSp>
+      <mc:AlternateContent xmlns:mc="http://schemas.openxmlformats.org/markup-compatibility/2006">
+        <mc:Choice xmlns:p14="http://schemas.microsoft.com/office/powerpoint/2010/main" Requires="p14">
+          <p:contentPart p14:bwMode="auto" r:id="rId3">
+            <p14:nvContentPartPr>
+              <p14:cNvPr id="17" name="Ink 16">
+                <a:extLst>
+                  <a:ext uri="{FF2B5EF4-FFF2-40B4-BE49-F238E27FC236}">
+                    <a16:creationId xmlns:a16="http://schemas.microsoft.com/office/drawing/2014/main" id="{35B90CE7-835D-FB2E-689D-C855B80E3D4E}"/>
+                  </a:ext>
+                </a:extLst>
+              </p14:cNvPr>
+              <p14:cNvContentPartPr/>
+              <p14:nvPr/>
+            </p14:nvContentPartPr>
+            <p14:xfrm>
+              <a:off x="3778027" y="4063440"/>
+              <a:ext cx="1202040" cy="943200"/>
+            </p14:xfrm>
+          </p:contentPart>
+        </mc:Choice>
+        <mc:Fallback>
+          <p:pic>
+            <p:nvPicPr>
+              <p:cNvPr id="17" name="Ink 16">
+                <a:extLst>
+                  <a:ext uri="{FF2B5EF4-FFF2-40B4-BE49-F238E27FC236}">
+                    <a16:creationId xmlns:a16="http://schemas.microsoft.com/office/drawing/2014/main" id="{35B90CE7-835D-FB2E-689D-C855B80E3D4E}"/>
+                  </a:ext>
+                </a:extLst>
+              </p:cNvPr>
+              <p:cNvPicPr/>
+              <p:nvPr/>
+            </p:nvPicPr>
+            <p:blipFill>
+              <a:blip r:embed="rId4"/>
+              <a:stretch>
+                <a:fillRect/>
+              </a:stretch>
+            </p:blipFill>
+            <p:spPr>
+              <a:xfrm>
+                <a:off x="3771907" y="4057320"/>
+                <a:ext cx="1214280" cy="955440"/>
+              </a:xfrm>
+              <a:prstGeom prst="rect">
+                <a:avLst/>
+              </a:prstGeom>
+            </p:spPr>
+          </p:pic>
+        </mc:Fallback>
+      </mc:AlternateContent>
+      <p:cxnSp>
+        <p:nvCxnSpPr>
+          <p:cNvPr id="19" name="Straight Arrow Connector 18">
+            <a:extLst>
+              <a:ext uri="{FF2B5EF4-FFF2-40B4-BE49-F238E27FC236}">
+                <a16:creationId xmlns:a16="http://schemas.microsoft.com/office/drawing/2014/main" id="{1F1E718E-F20F-DE31-9267-5F3CCD651F59}"/>
+              </a:ext>
+            </a:extLst>
+          </p:cNvPr>
+          <p:cNvCxnSpPr>
+            <a:cxnSpLocks/>
+          </p:cNvCxnSpPr>
+          <p:nvPr/>
+        </p:nvCxnSpPr>
+        <p:spPr>
+          <a:xfrm>
+            <a:off x="4876800" y="4953000"/>
+            <a:ext cx="628517" cy="533400"/>
+          </a:xfrm>
+          <a:prstGeom prst="straightConnector1">
+            <a:avLst/>
+          </a:prstGeom>
+          <a:ln w="19050" cap="flat" cmpd="sng" algn="ctr">
+            <a:solidFill>
+              <a:schemeClr val="accent3"/>
+            </a:solidFill>
+            <a:prstDash val="solid"/>
+            <a:round/>
+            <a:headEnd type="none" w="med" len="med"/>
+            <a:tailEnd type="arrow" w="med" len="med"/>
+          </a:ln>
+        </p:spPr>
+        <p:style>
+          <a:lnRef idx="0">
+            <a:scrgbClr r="0" g="0" b="0"/>
+          </a:lnRef>
+          <a:fillRef idx="0">
+            <a:scrgbClr r="0" g="0" b="0"/>
+          </a:fillRef>
+          <a:effectRef idx="0">
+            <a:scrgbClr r="0" g="0" b="0"/>
+          </a:effectRef>
+          <a:fontRef idx="minor">
+            <a:schemeClr val="tx1"/>
+          </a:fontRef>
+        </p:style>
+      </p:cxnSp>
+      <p:pic>
+        <p:nvPicPr>
+          <p:cNvPr id="23" name="Picture 22">
+            <a:extLst>
+              <a:ext uri="{FF2B5EF4-FFF2-40B4-BE49-F238E27FC236}">
+                <a16:creationId xmlns:a16="http://schemas.microsoft.com/office/drawing/2014/main" id="{8EA3DA16-0CC0-F140-BA09-9854E782E696}"/>
+              </a:ext>
+            </a:extLst>
+          </p:cNvPr>
+          <p:cNvPicPr>
+            <a:picLocks noChangeAspect="1"/>
+          </p:cNvPicPr>
+          <p:nvPr/>
+        </p:nvPicPr>
+        <p:blipFill>
+          <a:blip r:embed="rId5"/>
+          <a:stretch>
+            <a:fillRect/>
+          </a:stretch>
+        </p:blipFill>
+        <p:spPr>
+          <a:xfrm>
+            <a:off x="24021" y="6095999"/>
+            <a:ext cx="4519430" cy="682275"/>
+          </a:xfrm>
+          <a:prstGeom prst="rect">
+            <a:avLst/>
+          </a:prstGeom>
+        </p:spPr>
+      </p:pic>
+    </p:spTree>
+    <p:extLst>
+      <p:ext uri="{BB962C8B-B14F-4D97-AF65-F5344CB8AC3E}">
+        <p14:creationId xmlns:p14="http://schemas.microsoft.com/office/powerpoint/2010/main" val="3471795961"/>
+      </p:ext>
+    </p:extLst>
+  </p:cSld>
+  <p:clrMapOvr>
+    <a:masterClrMapping/>
+  </p:clrMapOvr>
+</p:sld>
+</file>
+
+<file path=ppt/slides/slide6.xml><?xml version="1.0" encoding="utf-8"?>
 <p:sld xmlns:a="http://schemas.openxmlformats.org/drawingml/2006/main" xmlns:r="http://schemas.openxmlformats.org/officeDocument/2006/relationships" xmlns:p="http://schemas.openxmlformats.org/presentationml/2006/main">
   <p:cSld>
     <p:bg>
@@ -5227,7 +5651,7 @@
         </p:nvSpPr>
         <p:spPr bwMode="auto">
           <a:xfrm>
-            <a:off x="2128437" y="1600200"/>
+            <a:off x="2016006" y="745166"/>
             <a:ext cx="6615914" cy="3139321"/>
           </a:xfrm>
           <a:prstGeom prst="rect">
@@ -5460,7 +5884,95 @@
 </p:sld>
 </file>
 
-<file path=ppt/slides/slide5.xml><?xml version="1.0" encoding="utf-8"?>
+<file path=ppt/slides/slide7.xml><?xml version="1.0" encoding="utf-8"?>
+<p:sld xmlns:a="http://schemas.openxmlformats.org/drawingml/2006/main" xmlns:r="http://schemas.openxmlformats.org/officeDocument/2006/relationships" xmlns:p="http://schemas.openxmlformats.org/presentationml/2006/main">
+  <p:cSld>
+    <p:spTree>
+      <p:nvGrpSpPr>
+        <p:cNvPr id="1" name=""/>
+        <p:cNvGrpSpPr/>
+        <p:nvPr/>
+      </p:nvGrpSpPr>
+      <p:grpSpPr>
+        <a:xfrm>
+          <a:off x="0" y="0"/>
+          <a:ext cx="0" cy="0"/>
+          <a:chOff x="0" y="0"/>
+          <a:chExt cx="0" cy="0"/>
+        </a:xfrm>
+      </p:grpSpPr>
+      <p:sp>
+        <p:nvSpPr>
+          <p:cNvPr id="2" name="Title 1">
+            <a:extLst>
+              <a:ext uri="{FF2B5EF4-FFF2-40B4-BE49-F238E27FC236}">
+                <a16:creationId xmlns:a16="http://schemas.microsoft.com/office/drawing/2014/main" id="{9A644A17-142F-C5AB-05BA-406B31D11DF9}"/>
+              </a:ext>
+            </a:extLst>
+          </p:cNvPr>
+          <p:cNvSpPr>
+            <a:spLocks noGrp="1"/>
+          </p:cNvSpPr>
+          <p:nvPr>
+            <p:ph type="title"/>
+          </p:nvPr>
+        </p:nvSpPr>
+        <p:spPr/>
+        <p:txBody>
+          <a:bodyPr/>
+          <a:lstStyle/>
+          <a:p>
+            <a:r>
+              <a:rPr lang="en-US" dirty="0"/>
+              <a:t>Client Screenshot</a:t>
+            </a:r>
+          </a:p>
+        </p:txBody>
+      </p:sp>
+      <p:pic>
+        <p:nvPicPr>
+          <p:cNvPr id="5" name="Picture 4">
+            <a:extLst>
+              <a:ext uri="{FF2B5EF4-FFF2-40B4-BE49-F238E27FC236}">
+                <a16:creationId xmlns:a16="http://schemas.microsoft.com/office/drawing/2014/main" id="{35D418AE-B3A5-82F0-B5CD-1031029A875B}"/>
+              </a:ext>
+            </a:extLst>
+          </p:cNvPr>
+          <p:cNvPicPr>
+            <a:picLocks noChangeAspect="1"/>
+          </p:cNvPicPr>
+          <p:nvPr/>
+        </p:nvPicPr>
+        <p:blipFill>
+          <a:blip r:embed="rId2"/>
+          <a:stretch>
+            <a:fillRect/>
+          </a:stretch>
+        </p:blipFill>
+        <p:spPr>
+          <a:xfrm>
+            <a:off x="838200" y="1342994"/>
+            <a:ext cx="7467600" cy="5395943"/>
+          </a:xfrm>
+          <a:prstGeom prst="rect">
+            <a:avLst/>
+          </a:prstGeom>
+        </p:spPr>
+      </p:pic>
+    </p:spTree>
+    <p:extLst>
+      <p:ext uri="{BB962C8B-B14F-4D97-AF65-F5344CB8AC3E}">
+        <p14:creationId xmlns:p14="http://schemas.microsoft.com/office/powerpoint/2010/main" val="3307967115"/>
+      </p:ext>
+    </p:extLst>
+  </p:cSld>
+  <p:clrMapOvr>
+    <a:masterClrMapping/>
+  </p:clrMapOvr>
+</p:sld>
+</file>
+
+<file path=ppt/slides/slide8.xml><?xml version="1.0" encoding="utf-8"?>
 <p:sld xmlns:a="http://schemas.openxmlformats.org/drawingml/2006/main" xmlns:r="http://schemas.openxmlformats.org/officeDocument/2006/relationships" xmlns:p="http://schemas.openxmlformats.org/presentationml/2006/main">
   <p:cSld>
     <p:bg>

</xml_diff>

<commit_message>
Updated presentation and message format
</commit_message>
<xml_diff>
--- a/Pirate_Chat_Presentation.pptx
+++ b/Pirate_Chat_Presentation.pptx
@@ -5,10 +5,10 @@
     <p:sldMasterId id="2147483648" r:id="rId1"/>
   </p:sldMasterIdLst>
   <p:notesMasterIdLst>
-    <p:notesMasterId r:id="rId10"/>
+    <p:notesMasterId r:id="rId12"/>
   </p:notesMasterIdLst>
   <p:handoutMasterIdLst>
-    <p:handoutMasterId r:id="rId11"/>
+    <p:handoutMasterId r:id="rId13"/>
   </p:handoutMasterIdLst>
   <p:sldIdLst>
     <p:sldId id="256" r:id="rId2"/>
@@ -19,6 +19,8 @@
     <p:sldId id="262" r:id="rId7"/>
     <p:sldId id="266" r:id="rId8"/>
     <p:sldId id="263" r:id="rId9"/>
+    <p:sldId id="267" r:id="rId10"/>
+    <p:sldId id="268" r:id="rId11"/>
   </p:sldIdLst>
   <p:sldSz cx="9144000" cy="6858000" type="screen4x3"/>
   <p:notesSz cx="6858000" cy="9144000"/>
@@ -1387,6 +1389,127 @@
     <p:extLst>
       <p:ext uri="{BB962C8B-B14F-4D97-AF65-F5344CB8AC3E}">
         <p14:creationId xmlns:p14="http://schemas.microsoft.com/office/powerpoint/2010/main" val="3269576451"/>
+      </p:ext>
+    </p:extLst>
+  </p:cSld>
+  <p:clrMapOvr>
+    <a:masterClrMapping/>
+  </p:clrMapOvr>
+</p:notes>
+</file>
+
+<file path=ppt/notesSlides/notesSlide6.xml><?xml version="1.0" encoding="utf-8"?>
+<p:notes xmlns:a="http://schemas.openxmlformats.org/drawingml/2006/main" xmlns:r="http://schemas.openxmlformats.org/officeDocument/2006/relationships" xmlns:p="http://schemas.openxmlformats.org/presentationml/2006/main">
+  <p:cSld>
+    <p:spTree>
+      <p:nvGrpSpPr>
+        <p:cNvPr id="1" name="">
+          <a:extLst>
+            <a:ext uri="{FF2B5EF4-FFF2-40B4-BE49-F238E27FC236}">
+              <a16:creationId xmlns:a16="http://schemas.microsoft.com/office/drawing/2014/main" id="{AF87FB32-7CFA-25AB-34BD-91804CE13805}"/>
+            </a:ext>
+          </a:extLst>
+        </p:cNvPr>
+        <p:cNvGrpSpPr/>
+        <p:nvPr/>
+      </p:nvGrpSpPr>
+      <p:grpSpPr>
+        <a:xfrm>
+          <a:off x="0" y="0"/>
+          <a:ext cx="0" cy="0"/>
+          <a:chOff x="0" y="0"/>
+          <a:chExt cx="0" cy="0"/>
+        </a:xfrm>
+      </p:grpSpPr>
+      <p:sp>
+        <p:nvSpPr>
+          <p:cNvPr id="7170" name="Rectangle 7">
+            <a:extLst>
+              <a:ext uri="{FF2B5EF4-FFF2-40B4-BE49-F238E27FC236}">
+                <a16:creationId xmlns:a16="http://schemas.microsoft.com/office/drawing/2014/main" id="{C295C22D-33A7-5A47-9D78-907FB8E2C158}"/>
+              </a:ext>
+            </a:extLst>
+          </p:cNvPr>
+          <p:cNvSpPr>
+            <a:spLocks noGrp="1" noChangeArrowheads="1"/>
+          </p:cNvSpPr>
+          <p:nvPr>
+            <p:ph type="sldNum" sz="quarter" idx="5"/>
+          </p:nvPr>
+        </p:nvSpPr>
+        <p:spPr>
+          <a:noFill/>
+          <a:ln>
+            <a:miter lim="800000"/>
+            <a:headEnd/>
+            <a:tailEnd/>
+          </a:ln>
+        </p:spPr>
+        <p:txBody>
+          <a:bodyPr/>
+          <a:lstStyle/>
+          <a:p>
+            <a:fld id="{83E94E94-3B75-4F3F-B89E-0A92FF3741DE}" type="slidenum">
+              <a:rPr lang="en-US"/>
+              <a:pPr/>
+              <a:t>10</a:t>
+            </a:fld>
+            <a:endParaRPr lang="en-US"/>
+          </a:p>
+        </p:txBody>
+      </p:sp>
+      <p:sp>
+        <p:nvSpPr>
+          <p:cNvPr id="7171" name="Rectangle 2">
+            <a:extLst>
+              <a:ext uri="{FF2B5EF4-FFF2-40B4-BE49-F238E27FC236}">
+                <a16:creationId xmlns:a16="http://schemas.microsoft.com/office/drawing/2014/main" id="{419E90DC-3E06-AE01-43E8-2E8C11B4F1AA}"/>
+              </a:ext>
+            </a:extLst>
+          </p:cNvPr>
+          <p:cNvSpPr>
+            <a:spLocks noGrp="1" noRot="1" noChangeAspect="1" noChangeArrowheads="1" noTextEdit="1"/>
+          </p:cNvSpPr>
+          <p:nvPr>
+            <p:ph type="sldImg"/>
+          </p:nvPr>
+        </p:nvSpPr>
+        <p:spPr>
+          <a:ln/>
+        </p:spPr>
+      </p:sp>
+      <p:sp>
+        <p:nvSpPr>
+          <p:cNvPr id="7172" name="Rectangle 3">
+            <a:extLst>
+              <a:ext uri="{FF2B5EF4-FFF2-40B4-BE49-F238E27FC236}">
+                <a16:creationId xmlns:a16="http://schemas.microsoft.com/office/drawing/2014/main" id="{AC4BFD7F-28BD-F486-28D2-C9FE47E9582B}"/>
+              </a:ext>
+            </a:extLst>
+          </p:cNvPr>
+          <p:cNvSpPr>
+            <a:spLocks noGrp="1" noChangeArrowheads="1"/>
+          </p:cNvSpPr>
+          <p:nvPr>
+            <p:ph type="body" idx="1"/>
+          </p:nvPr>
+        </p:nvSpPr>
+        <p:spPr>
+          <a:noFill/>
+        </p:spPr>
+        <p:txBody>
+          <a:bodyPr/>
+          <a:lstStyle/>
+          <a:p>
+            <a:pPr eaLnBrk="1" hangingPunct="1"/>
+            <a:endParaRPr lang="en-US"/>
+          </a:p>
+        </p:txBody>
+      </p:sp>
+    </p:spTree>
+    <p:extLst>
+      <p:ext uri="{BB962C8B-B14F-4D97-AF65-F5344CB8AC3E}">
+        <p14:creationId xmlns:p14="http://schemas.microsoft.com/office/powerpoint/2010/main" val="2866506462"/>
       </p:ext>
     </p:extLst>
   </p:cSld>
@@ -3574,6 +3697,80 @@
 </p:sld>
 </file>
 
+<file path=ppt/slides/slide10.xml><?xml version="1.0" encoding="utf-8"?>
+<p:sld xmlns:a="http://schemas.openxmlformats.org/drawingml/2006/main" xmlns:r="http://schemas.openxmlformats.org/officeDocument/2006/relationships" xmlns:p="http://schemas.openxmlformats.org/presentationml/2006/main">
+  <p:cSld>
+    <p:spTree>
+      <p:nvGrpSpPr>
+        <p:cNvPr id="1" name="">
+          <a:extLst>
+            <a:ext uri="{FF2B5EF4-FFF2-40B4-BE49-F238E27FC236}">
+              <a16:creationId xmlns:a16="http://schemas.microsoft.com/office/drawing/2014/main" id="{07ADD3D4-E94F-3E81-0604-C4A465F817A3}"/>
+            </a:ext>
+          </a:extLst>
+        </p:cNvPr>
+        <p:cNvGrpSpPr/>
+        <p:nvPr/>
+      </p:nvGrpSpPr>
+      <p:grpSpPr>
+        <a:xfrm>
+          <a:off x="0" y="0"/>
+          <a:ext cx="0" cy="0"/>
+          <a:chOff x="0" y="0"/>
+          <a:chExt cx="0" cy="0"/>
+        </a:xfrm>
+      </p:grpSpPr>
+      <p:sp>
+        <p:nvSpPr>
+          <p:cNvPr id="3074" name="Rectangle 2">
+            <a:extLst>
+              <a:ext uri="{FF2B5EF4-FFF2-40B4-BE49-F238E27FC236}">
+                <a16:creationId xmlns:a16="http://schemas.microsoft.com/office/drawing/2014/main" id="{FFED431A-6820-1383-7D39-2BCA9830B70C}"/>
+              </a:ext>
+            </a:extLst>
+          </p:cNvPr>
+          <p:cNvSpPr>
+            <a:spLocks noGrp="1" noChangeArrowheads="1"/>
+          </p:cNvSpPr>
+          <p:nvPr>
+            <p:ph type="ctrTitle"/>
+          </p:nvPr>
+        </p:nvSpPr>
+        <p:spPr>
+          <a:xfrm>
+            <a:off x="2051720" y="5661248"/>
+            <a:ext cx="5175250" cy="504825"/>
+          </a:xfrm>
+          <a:noFill/>
+        </p:spPr>
+        <p:txBody>
+          <a:bodyPr/>
+          <a:lstStyle/>
+          <a:p>
+            <a:pPr eaLnBrk="1" hangingPunct="1"/>
+            <a:r>
+              <a:rPr lang="en-US" sz="6600" dirty="0">
+                <a:latin typeface="Old English Text MT" panose="03040902040508030806" pitchFamily="66" charset="0"/>
+              </a:rPr>
+              <a:t>Pirate Chat</a:t>
+            </a:r>
+            <a:endParaRPr lang="uk-UA" sz="6600" dirty="0"/>
+          </a:p>
+        </p:txBody>
+      </p:sp>
+    </p:spTree>
+    <p:extLst>
+      <p:ext uri="{BB962C8B-B14F-4D97-AF65-F5344CB8AC3E}">
+        <p14:creationId xmlns:p14="http://schemas.microsoft.com/office/powerpoint/2010/main" val="170494132"/>
+      </p:ext>
+    </p:extLst>
+  </p:cSld>
+  <p:clrMapOvr>
+    <a:masterClrMapping/>
+  </p:clrMapOvr>
+</p:sld>
+</file>
+
 <file path=ppt/slides/slide2.xml><?xml version="1.0" encoding="utf-8"?>
 <p:sld xmlns:a="http://schemas.openxmlformats.org/drawingml/2006/main" xmlns:r="http://schemas.openxmlformats.org/officeDocument/2006/relationships" xmlns:p="http://schemas.openxmlformats.org/presentationml/2006/main">
   <p:cSld>
@@ -3632,7 +3829,7 @@
         </p:nvSpPr>
         <p:spPr>
           <a:xfrm>
-            <a:off x="2006600" y="950913"/>
+            <a:off x="1168400" y="1034945"/>
             <a:ext cx="8280400" cy="5068887"/>
           </a:xfrm>
         </p:spPr>
@@ -3659,26 +3856,39 @@
               </a:lnSpc>
               <a:buNone/>
             </a:pPr>
-            <a:r>
-              <a:rPr lang="en-US" sz="2000" dirty="0">
-                <a:solidFill>
-                  <a:srgbClr val="000000"/>
+            <a:endParaRPr lang="en-US" sz="2000" dirty="0">
+              <a:solidFill>
+                <a:srgbClr val="000000"/>
+              </a:solidFill>
+            </a:endParaRPr>
+          </a:p>
+          <a:p>
+            <a:pPr marL="0" indent="0" eaLnBrk="1" hangingPunct="1">
+              <a:lnSpc>
+                <a:spcPct val="80000"/>
+              </a:lnSpc>
+              <a:buNone/>
+            </a:pPr>
+            <a:r>
+              <a:rPr lang="en-US" sz="2000" b="1" dirty="0">
+                <a:solidFill>
+                  <a:schemeClr val="tx1"/>
                 </a:solidFill>
               </a:rPr>
               <a:t>Uses Python’s socket, </a:t>
             </a:r>
             <a:r>
-              <a:rPr lang="en-US" sz="2000" dirty="0" err="1">
-                <a:solidFill>
-                  <a:srgbClr val="000000"/>
+              <a:rPr lang="en-US" sz="2000" b="1" dirty="0" err="1">
+                <a:solidFill>
+                  <a:schemeClr val="tx1"/>
                 </a:solidFill>
               </a:rPr>
               <a:t>ssl</a:t>
             </a:r>
             <a:r>
-              <a:rPr lang="en-US" sz="2000" dirty="0">
-                <a:solidFill>
-                  <a:srgbClr val="000000"/>
+              <a:rPr lang="en-US" sz="2000" b="1" dirty="0">
+                <a:solidFill>
+                  <a:schemeClr val="tx1"/>
                 </a:solidFill>
               </a:rPr>
               <a:t>, and threads libraries</a:t>
@@ -3738,7 +3948,7 @@
         </p:nvSpPr>
         <p:spPr bwMode="auto">
           <a:xfrm>
-            <a:off x="1934270" y="1675964"/>
+            <a:off x="1143000" y="1824038"/>
             <a:ext cx="5412059" cy="1754326"/>
           </a:xfrm>
           <a:prstGeom prst="rect">
@@ -3976,7 +4186,7 @@
         </p:nvSpPr>
         <p:spPr bwMode="auto">
           <a:xfrm>
-            <a:off x="1968459" y="3048000"/>
+            <a:off x="1177189" y="3196074"/>
             <a:ext cx="7023141" cy="1200329"/>
           </a:xfrm>
           <a:prstGeom prst="rect">
@@ -4150,7 +4360,7 @@
         </p:nvSpPr>
         <p:spPr bwMode="auto">
           <a:xfrm>
-            <a:off x="1968459" y="3962400"/>
+            <a:off x="1177189" y="4110474"/>
             <a:ext cx="5082545" cy="1200329"/>
           </a:xfrm>
           <a:prstGeom prst="rect">
@@ -4359,8 +4569,8 @@
         </p:nvSpPr>
         <p:spPr bwMode="auto">
           <a:xfrm>
-            <a:off x="1963400" y="4867870"/>
-            <a:ext cx="6304931" cy="923330"/>
+            <a:off x="1172130" y="5015944"/>
+            <a:ext cx="7048724" cy="923330"/>
           </a:xfrm>
           <a:prstGeom prst="rect">
             <a:avLst/>
@@ -4465,7 +4675,7 @@
                 <a:effectLst/>
                 <a:latin typeface="Arial" panose="020B0604020202020204" pitchFamily="34" charset="0"/>
               </a:rPr>
-              <a:t> Error handling with Exception and DEBUG messages.</a:t>
+              <a:t> Error handling with Exception and custom DEBUG messages.</a:t>
             </a:r>
           </a:p>
           <a:p>
@@ -4512,7 +4722,7 @@
         </p:nvSpPr>
         <p:spPr>
           <a:xfrm>
-            <a:off x="1969347" y="5585797"/>
+            <a:off x="1178077" y="5733871"/>
             <a:ext cx="5144346" cy="1200329"/>
           </a:xfrm>
           <a:prstGeom prst="rect">
@@ -4712,7 +4922,7 @@
             <a:r>
               <a:rPr lang="en-US" b="1" dirty="0">
                 <a:solidFill>
-                  <a:srgbClr val="000000"/>
+                  <a:schemeClr val="tx1"/>
                 </a:solidFill>
               </a:rPr>
               <a:t>Architecture</a:t>
@@ -4736,7 +4946,7 @@
         </p:nvSpPr>
         <p:spPr bwMode="auto">
           <a:xfrm>
-            <a:off x="2051720" y="669847"/>
+            <a:off x="2209800" y="836613"/>
             <a:ext cx="6651180" cy="4247317"/>
           </a:xfrm>
           <a:prstGeom prst="rect">
@@ -5283,19 +5493,6 @@
               <a:t> Ensures thread safety with </a:t>
             </a:r>
             <a:r>
-              <a:rPr kumimoji="0" lang="en-US" altLang="en-US" b="0" i="0" u="none" strike="noStrike" cap="none" normalizeH="0" baseline="0" dirty="0" err="1">
-                <a:ln>
-                  <a:noFill/>
-                </a:ln>
-                <a:solidFill>
-                  <a:schemeClr val="tx1"/>
-                </a:solidFill>
-                <a:effectLst/>
-                <a:latin typeface="Arial Unicode MS"/>
-              </a:rPr>
-              <a:t>threading.Lock</a:t>
-            </a:r>
-            <a:r>
               <a:rPr kumimoji="0" lang="en-US" altLang="en-US" b="0" i="0" u="none" strike="noStrike" cap="none" normalizeH="0" baseline="0" dirty="0">
                 <a:ln>
                   <a:noFill/>
@@ -5304,8 +5501,9 @@
                   <a:schemeClr val="tx1"/>
                 </a:solidFill>
                 <a:effectLst/>
+                <a:latin typeface="Arial Unicode MS"/>
               </a:rPr>
-              <a:t>.</a:t>
+              <a:t>threading lock</a:t>
             </a:r>
             <a:endParaRPr kumimoji="0" lang="en-US" altLang="en-US" b="0" i="0" u="none" strike="noStrike" cap="none" normalizeH="0" baseline="0" dirty="0">
               <a:ln>
@@ -5336,6 +5534,187 @@
               <a:tabLst/>
             </a:pPr>
             <a:endParaRPr kumimoji="0" lang="en-US" altLang="en-US" sz="1800" b="0" i="0" u="none" strike="noStrike" cap="none" normalizeH="0" baseline="0" dirty="0">
+              <a:ln>
+                <a:noFill/>
+              </a:ln>
+              <a:solidFill>
+                <a:schemeClr val="tx1"/>
+              </a:solidFill>
+              <a:effectLst/>
+              <a:latin typeface="Arial" panose="020B0604020202020204" pitchFamily="34" charset="0"/>
+            </a:endParaRPr>
+          </a:p>
+        </p:txBody>
+      </p:sp>
+      <p:sp>
+        <p:nvSpPr>
+          <p:cNvPr id="3" name="TextBox 2">
+            <a:extLst>
+              <a:ext uri="{FF2B5EF4-FFF2-40B4-BE49-F238E27FC236}">
+                <a16:creationId xmlns:a16="http://schemas.microsoft.com/office/drawing/2014/main" id="{3FC17667-9B69-8122-2AA2-200AD8A3D682}"/>
+              </a:ext>
+            </a:extLst>
+          </p:cNvPr>
+          <p:cNvSpPr txBox="1"/>
+          <p:nvPr/>
+        </p:nvSpPr>
+        <p:spPr>
+          <a:xfrm>
+            <a:off x="2253333" y="4953000"/>
+            <a:ext cx="6711280" cy="923330"/>
+          </a:xfrm>
+          <a:prstGeom prst="rect">
+            <a:avLst/>
+          </a:prstGeom>
+          <a:noFill/>
+        </p:spPr>
+        <p:txBody>
+          <a:bodyPr wrap="square">
+            <a:spAutoFit/>
+          </a:bodyPr>
+          <a:lstStyle/>
+          <a:p>
+            <a:pPr marL="0" marR="0" lvl="0" indent="0" algn="l" defTabSz="914400" rtl="0" eaLnBrk="0" fontAlgn="base" latinLnBrk="0" hangingPunct="0">
+              <a:lnSpc>
+                <a:spcPct val="100000"/>
+              </a:lnSpc>
+              <a:spcBef>
+                <a:spcPct val="0"/>
+              </a:spcBef>
+              <a:spcAft>
+                <a:spcPct val="0"/>
+              </a:spcAft>
+              <a:buClrTx/>
+              <a:buSzTx/>
+              <a:buFontTx/>
+              <a:buChar char="•"/>
+              <a:tabLst/>
+            </a:pPr>
+            <a:r>
+              <a:rPr kumimoji="0" lang="en-US" altLang="en-US" sz="1800" b="1" i="0" u="none" strike="noStrike" cap="none" normalizeH="0" baseline="0" dirty="0">
+                <a:ln>
+                  <a:noFill/>
+                </a:ln>
+                <a:solidFill>
+                  <a:schemeClr val="tx1"/>
+                </a:solidFill>
+                <a:effectLst/>
+                <a:latin typeface="Arial" panose="020B0604020202020204" pitchFamily="34" charset="0"/>
+              </a:rPr>
+              <a:t>Encryption</a:t>
+            </a:r>
+            <a:r>
+              <a:rPr kumimoji="0" lang="en-US" altLang="en-US" sz="1800" b="0" i="0" u="none" strike="noStrike" cap="none" normalizeH="0" baseline="0" dirty="0">
+                <a:ln>
+                  <a:noFill/>
+                </a:ln>
+                <a:solidFill>
+                  <a:schemeClr val="tx1"/>
+                </a:solidFill>
+                <a:effectLst/>
+                <a:latin typeface="Arial" panose="020B0604020202020204" pitchFamily="34" charset="0"/>
+              </a:rPr>
+              <a:t>:</a:t>
+            </a:r>
+          </a:p>
+          <a:p>
+            <a:pPr marL="457200" marR="0" lvl="1" indent="0" algn="l" defTabSz="914400" rtl="0" eaLnBrk="0" fontAlgn="base" latinLnBrk="0" hangingPunct="0">
+              <a:lnSpc>
+                <a:spcPct val="100000"/>
+              </a:lnSpc>
+              <a:spcBef>
+                <a:spcPct val="0"/>
+              </a:spcBef>
+              <a:spcAft>
+                <a:spcPct val="0"/>
+              </a:spcAft>
+              <a:buClrTx/>
+              <a:buSzTx/>
+              <a:buFontTx/>
+              <a:buChar char="•"/>
+              <a:tabLst/>
+            </a:pPr>
+            <a:r>
+              <a:rPr kumimoji="0" lang="en-US" altLang="en-US" sz="1800" b="0" i="0" u="none" strike="noStrike" cap="none" normalizeH="0" baseline="0" dirty="0">
+                <a:ln>
+                  <a:noFill/>
+                </a:ln>
+                <a:solidFill>
+                  <a:schemeClr val="tx1"/>
+                </a:solidFill>
+                <a:effectLst/>
+                <a:latin typeface="Arial" panose="020B0604020202020204" pitchFamily="34" charset="0"/>
+              </a:rPr>
+              <a:t> Uses python’s SSL library to wrap sockets</a:t>
+            </a:r>
+            <a:endParaRPr kumimoji="0" lang="en-US" altLang="en-US" b="0" i="0" u="none" strike="noStrike" cap="none" normalizeH="0" baseline="0" dirty="0">
+              <a:ln>
+                <a:noFill/>
+              </a:ln>
+              <a:solidFill>
+                <a:schemeClr val="tx1"/>
+              </a:solidFill>
+              <a:effectLst/>
+              <a:latin typeface="Arial" panose="020B0604020202020204" pitchFamily="34" charset="0"/>
+            </a:endParaRPr>
+          </a:p>
+          <a:p>
+            <a:pPr marL="457200" marR="0" lvl="1" indent="0" algn="l" defTabSz="914400" rtl="0" eaLnBrk="0" fontAlgn="base" latinLnBrk="0" hangingPunct="0">
+              <a:lnSpc>
+                <a:spcPct val="100000"/>
+              </a:lnSpc>
+              <a:spcBef>
+                <a:spcPct val="0"/>
+              </a:spcBef>
+              <a:spcAft>
+                <a:spcPct val="0"/>
+              </a:spcAft>
+              <a:buClrTx/>
+              <a:buSzTx/>
+              <a:buFontTx/>
+              <a:buChar char="•"/>
+              <a:tabLst/>
+            </a:pPr>
+            <a:r>
+              <a:rPr kumimoji="0" lang="en-US" altLang="en-US" sz="1800" b="0" i="0" u="none" strike="noStrike" cap="none" normalizeH="0" baseline="0" dirty="0">
+                <a:ln>
+                  <a:noFill/>
+                </a:ln>
+                <a:solidFill>
+                  <a:schemeClr val="tx1"/>
+                </a:solidFill>
+                <a:effectLst/>
+                <a:latin typeface="Arial" panose="020B0604020202020204" pitchFamily="34" charset="0"/>
+              </a:rPr>
+              <a:t> Uses self-signed certificate “server.crt” and “</a:t>
+            </a:r>
+            <a:r>
+              <a:rPr kumimoji="0" lang="en-US" altLang="en-US" sz="1800" b="0" i="0" u="none" strike="noStrike" cap="none" normalizeH="0" baseline="0" dirty="0" err="1">
+                <a:ln>
+                  <a:noFill/>
+                </a:ln>
+                <a:solidFill>
+                  <a:schemeClr val="tx1"/>
+                </a:solidFill>
+                <a:effectLst/>
+                <a:latin typeface="Arial" panose="020B0604020202020204" pitchFamily="34" charset="0"/>
+              </a:rPr>
+              <a:t>server.key</a:t>
+            </a:r>
+            <a:r>
+              <a:rPr kumimoji="0" lang="en-US" altLang="en-US" sz="1800" b="0" i="0" u="none" strike="noStrike" cap="none" normalizeH="0" baseline="0" dirty="0">
+                <a:ln>
+                  <a:noFill/>
+                </a:ln>
+                <a:solidFill>
+                  <a:schemeClr val="tx1"/>
+                </a:solidFill>
+                <a:effectLst/>
+                <a:latin typeface="Arial" panose="020B0604020202020204" pitchFamily="34" charset="0"/>
+              </a:rPr>
+              <a:t>”</a:t>
+            </a:r>
+            <a:endParaRPr kumimoji="0" lang="en-US" altLang="en-US" b="0" i="0" u="none" strike="noStrike" cap="none" normalizeH="0" baseline="0" dirty="0">
               <a:ln>
                 <a:noFill/>
               </a:ln>
@@ -5423,12 +5802,39 @@
         </p:blipFill>
         <p:spPr>
           <a:xfrm>
-            <a:off x="762000" y="1676400"/>
-            <a:ext cx="7936284" cy="4605337"/>
+            <a:off x="152400" y="1676400"/>
+            <a:ext cx="8866424" cy="5145087"/>
           </a:xfrm>
-          <a:prstGeom prst="rect">
-            <a:avLst/>
+          <a:prstGeom prst="roundRect">
+            <a:avLst>
+              <a:gd name="adj" fmla="val 11111"/>
+            </a:avLst>
           </a:prstGeom>
+          <a:ln w="190500" cap="rnd">
+            <a:solidFill>
+              <a:srgbClr val="C8C6BD"/>
+            </a:solidFill>
+            <a:prstDash val="solid"/>
+          </a:ln>
+          <a:effectLst>
+            <a:outerShdw blurRad="101600" dist="50800" dir="7200000" algn="tl" rotWithShape="0">
+              <a:srgbClr val="000000">
+                <a:alpha val="45000"/>
+              </a:srgbClr>
+            </a:outerShdw>
+          </a:effectLst>
+          <a:scene3d>
+            <a:camera prst="perspectiveFront" fov="5400000"/>
+            <a:lightRig rig="threePt" dir="t">
+              <a:rot lat="0" lon="0" rev="19200000"/>
+            </a:lightRig>
+          </a:scene3d>
+          <a:sp3d extrusionH="25400">
+            <a:bevelT w="304800" h="152400" prst="hardEdge"/>
+            <a:extrusionClr>
+              <a:srgbClr val="FFFFFF"/>
+            </a:extrusionClr>
+          </a:sp3d>
         </p:spPr>
       </p:pic>
     </p:spTree>
@@ -5517,6 +5923,12 @@
           <a:prstGeom prst="rect">
             <a:avLst/>
           </a:prstGeom>
+          <a:ln>
+            <a:noFill/>
+          </a:ln>
+          <a:effectLst>
+            <a:softEdge rad="112500"/>
+          </a:effectLst>
         </p:spPr>
       </p:pic>
       <p:cxnSp>
@@ -5796,7 +6208,7 @@
         </p:nvSpPr>
         <p:spPr bwMode="auto">
           <a:xfrm>
-            <a:off x="2016006" y="745166"/>
+            <a:off x="2128437" y="1859339"/>
             <a:ext cx="6615914" cy="3139321"/>
           </a:xfrm>
           <a:prstGeom prst="rect">
@@ -6062,7 +6474,12 @@
             <p:ph type="title"/>
           </p:nvPr>
         </p:nvSpPr>
-        <p:spPr/>
+        <p:spPr>
+          <a:xfrm>
+            <a:off x="1722437" y="330200"/>
+            <a:ext cx="7345363" cy="508000"/>
+          </a:xfrm>
+        </p:spPr>
         <p:txBody>
           <a:bodyPr/>
           <a:lstStyle/>
@@ -6096,12 +6513,39 @@
         </p:blipFill>
         <p:spPr>
           <a:xfrm>
-            <a:off x="838200" y="1342994"/>
+            <a:off x="838200" y="1371600"/>
             <a:ext cx="7467600" cy="5395943"/>
           </a:xfrm>
-          <a:prstGeom prst="rect">
-            <a:avLst/>
+          <a:prstGeom prst="roundRect">
+            <a:avLst>
+              <a:gd name="adj" fmla="val 11111"/>
+            </a:avLst>
           </a:prstGeom>
+          <a:ln w="190500" cap="rnd">
+            <a:solidFill>
+              <a:srgbClr val="C8C6BD"/>
+            </a:solidFill>
+            <a:prstDash val="solid"/>
+          </a:ln>
+          <a:effectLst>
+            <a:outerShdw blurRad="101600" dist="50800" dir="7200000" algn="tl" rotWithShape="0">
+              <a:srgbClr val="000000">
+                <a:alpha val="45000"/>
+              </a:srgbClr>
+            </a:outerShdw>
+          </a:effectLst>
+          <a:scene3d>
+            <a:camera prst="perspectiveFront" fov="5400000"/>
+            <a:lightRig rig="threePt" dir="t">
+              <a:rot lat="0" lon="0" rev="19200000"/>
+            </a:lightRig>
+          </a:scene3d>
+          <a:sp3d extrusionH="25400">
+            <a:bevelT w="304800" h="152400" prst="hardEdge"/>
+            <a:extrusionClr>
+              <a:srgbClr val="FFFFFF"/>
+            </a:extrusionClr>
+          </a:sp3d>
         </p:spPr>
       </p:pic>
     </p:spTree>
@@ -6206,8 +6650,8 @@
         </p:nvSpPr>
         <p:spPr bwMode="auto">
           <a:xfrm>
-            <a:off x="2051720" y="1443841"/>
-            <a:ext cx="6912893" cy="3970318"/>
+            <a:off x="2051720" y="1370886"/>
+            <a:ext cx="6912893" cy="4801314"/>
           </a:xfrm>
           <a:prstGeom prst="rect">
             <a:avLst/>
@@ -6301,28 +6745,12 @@
               <a:buChar char="•"/>
             </a:pPr>
             <a:r>
-              <a:rPr lang="en-US" b="1" dirty="0" err="1">
+              <a:rPr lang="en-US" b="1" dirty="0">
                 <a:solidFill>
                   <a:schemeClr val="bg2"/>
                 </a:solidFill>
               </a:rPr>
-              <a:t>receive_messages</a:t>
-            </a:r>
-            <a:r>
-              <a:rPr lang="en-US" b="1" dirty="0">
-                <a:solidFill>
-                  <a:schemeClr val="bg2"/>
-                </a:solidFill>
-              </a:rPr>
-              <a:t>() </a:t>
-            </a:r>
-            <a:r>
-              <a:rPr lang="en-US" dirty="0">
-                <a:solidFill>
-                  <a:schemeClr val="bg2"/>
-                </a:solidFill>
-              </a:rPr>
-              <a:t>runs in a background thread for real-time listening.</a:t>
+              <a:t>connect() handles connection state and thread creation</a:t>
             </a:r>
           </a:p>
           <a:p>
@@ -6347,7 +6775,7 @@
                   <a:schemeClr val="bg2"/>
                 </a:solidFill>
               </a:rPr>
-              <a:t>send_message</a:t>
+              <a:t>receive_messages</a:t>
             </a:r>
             <a:r>
               <a:rPr lang="en-US" b="1" dirty="0">
@@ -6363,7 +6791,7 @@
                   <a:schemeClr val="bg2"/>
                 </a:solidFill>
               </a:rPr>
-              <a:t>sends messages to a specific client using their ID.</a:t>
+              <a:t>runs in a background thread for real-time listening.</a:t>
             </a:r>
           </a:p>
           <a:p>
@@ -6388,7 +6816,7 @@
                   <a:schemeClr val="bg2"/>
                 </a:solidFill>
               </a:rPr>
-              <a:t>request_client_list</a:t>
+              <a:t>send_message</a:t>
             </a:r>
             <a:r>
               <a:rPr lang="en-US" b="1" dirty="0">
@@ -6404,7 +6832,48 @@
                   <a:schemeClr val="bg2"/>
                 </a:solidFill>
               </a:rPr>
-              <a:t>asks server for current client list.</a:t>
+              <a:t>sends messages to a specific client using their ID.</a:t>
+            </a:r>
+          </a:p>
+          <a:p>
+            <a:pPr marL="285750" indent="-285750">
+              <a:buFont typeface="Arial" panose="020B0604020202020204" pitchFamily="34" charset="0"/>
+              <a:buChar char="•"/>
+            </a:pPr>
+            <a:endParaRPr lang="en-US" dirty="0">
+              <a:solidFill>
+                <a:schemeClr val="bg2"/>
+              </a:solidFill>
+            </a:endParaRPr>
+          </a:p>
+          <a:p>
+            <a:pPr marL="285750" indent="-285750">
+              <a:buFont typeface="Arial" panose="020B0604020202020204" pitchFamily="34" charset="0"/>
+              <a:buChar char="•"/>
+            </a:pPr>
+            <a:r>
+              <a:rPr lang="en-US" b="1" dirty="0" err="1">
+                <a:solidFill>
+                  <a:schemeClr val="bg2"/>
+                </a:solidFill>
+              </a:rPr>
+              <a:t>handle_user_input</a:t>
+            </a:r>
+            <a:r>
+              <a:rPr lang="en-US" b="1" dirty="0">
+                <a:solidFill>
+                  <a:schemeClr val="bg2"/>
+                </a:solidFill>
+              </a:rPr>
+              <a:t>() </a:t>
+            </a:r>
+            <a:r>
+              <a:rPr lang="en-US" dirty="0">
+                <a:solidFill>
+                  <a:schemeClr val="bg2"/>
+                </a:solidFill>
+              </a:rPr>
+              <a:t>handles user input and special commands</a:t>
             </a:r>
           </a:p>
           <a:p>
@@ -6481,6 +6950,118 @@
     <p:extLst>
       <p:ext uri="{BB962C8B-B14F-4D97-AF65-F5344CB8AC3E}">
         <p14:creationId xmlns:p14="http://schemas.microsoft.com/office/powerpoint/2010/main" val="3509026399"/>
+      </p:ext>
+    </p:extLst>
+  </p:cSld>
+  <p:clrMapOvr>
+    <a:masterClrMapping/>
+  </p:clrMapOvr>
+</p:sld>
+</file>
+
+<file path=ppt/slides/slide9.xml><?xml version="1.0" encoding="utf-8"?>
+<p:sld xmlns:a="http://schemas.openxmlformats.org/drawingml/2006/main" xmlns:r="http://schemas.openxmlformats.org/officeDocument/2006/relationships" xmlns:p="http://schemas.openxmlformats.org/presentationml/2006/main">
+  <p:cSld>
+    <p:spTree>
+      <p:nvGrpSpPr>
+        <p:cNvPr id="1" name=""/>
+        <p:cNvGrpSpPr/>
+        <p:nvPr/>
+      </p:nvGrpSpPr>
+      <p:grpSpPr>
+        <a:xfrm>
+          <a:off x="0" y="0"/>
+          <a:ext cx="0" cy="0"/>
+          <a:chOff x="0" y="0"/>
+          <a:chExt cx="0" cy="0"/>
+        </a:xfrm>
+      </p:grpSpPr>
+      <p:sp>
+        <p:nvSpPr>
+          <p:cNvPr id="2" name="Title 1">
+            <a:extLst>
+              <a:ext uri="{FF2B5EF4-FFF2-40B4-BE49-F238E27FC236}">
+                <a16:creationId xmlns:a16="http://schemas.microsoft.com/office/drawing/2014/main" id="{58366A9E-925A-04C3-45CB-C64795438804}"/>
+              </a:ext>
+            </a:extLst>
+          </p:cNvPr>
+          <p:cNvSpPr>
+            <a:spLocks noGrp="1"/>
+          </p:cNvSpPr>
+          <p:nvPr>
+            <p:ph type="title"/>
+          </p:nvPr>
+        </p:nvSpPr>
+        <p:spPr/>
+        <p:txBody>
+          <a:bodyPr/>
+          <a:lstStyle/>
+          <a:p>
+            <a:r>
+              <a:rPr lang="en-US" dirty="0"/>
+              <a:t>Just Chatting…</a:t>
+            </a:r>
+          </a:p>
+        </p:txBody>
+      </p:sp>
+      <p:pic>
+        <p:nvPicPr>
+          <p:cNvPr id="5" name="Picture 4">
+            <a:extLst>
+              <a:ext uri="{FF2B5EF4-FFF2-40B4-BE49-F238E27FC236}">
+                <a16:creationId xmlns:a16="http://schemas.microsoft.com/office/drawing/2014/main" id="{1DEAA1F5-565B-6CD3-D292-80F32207E9C2}"/>
+              </a:ext>
+            </a:extLst>
+          </p:cNvPr>
+          <p:cNvPicPr>
+            <a:picLocks noChangeAspect="1"/>
+          </p:cNvPicPr>
+          <p:nvPr/>
+        </p:nvPicPr>
+        <p:blipFill>
+          <a:blip r:embed="rId2"/>
+          <a:stretch>
+            <a:fillRect/>
+          </a:stretch>
+        </p:blipFill>
+        <p:spPr>
+          <a:xfrm>
+            <a:off x="16933" y="1802964"/>
+            <a:ext cx="9144000" cy="4842416"/>
+          </a:xfrm>
+          <a:prstGeom prst="roundRect">
+            <a:avLst>
+              <a:gd name="adj" fmla="val 16667"/>
+            </a:avLst>
+          </a:prstGeom>
+          <a:ln>
+            <a:noFill/>
+          </a:ln>
+          <a:effectLst>
+            <a:outerShdw blurRad="76200" dist="38100" dir="7800000" algn="tl" rotWithShape="0">
+              <a:srgbClr val="000000">
+                <a:alpha val="40000"/>
+              </a:srgbClr>
+            </a:outerShdw>
+          </a:effectLst>
+          <a:scene3d>
+            <a:camera prst="orthographicFront"/>
+            <a:lightRig rig="contrasting" dir="t">
+              <a:rot lat="0" lon="0" rev="4200000"/>
+            </a:lightRig>
+          </a:scene3d>
+          <a:sp3d prstMaterial="plastic">
+            <a:bevelT w="381000" h="114300" prst="relaxedInset"/>
+            <a:contourClr>
+              <a:srgbClr val="969696"/>
+            </a:contourClr>
+          </a:sp3d>
+        </p:spPr>
+      </p:pic>
+    </p:spTree>
+    <p:extLst>
+      <p:ext uri="{BB962C8B-B14F-4D97-AF65-F5344CB8AC3E}">
+        <p14:creationId xmlns:p14="http://schemas.microsoft.com/office/powerpoint/2010/main" val="187975698"/>
       </p:ext>
     </p:extLst>
   </p:cSld>

</xml_diff>